<commit_message>
Version bumps and c# 8 demos
</commit_message>
<xml_diff>
--- a/CSPastPresentFuture.pptx
+++ b/CSPastPresentFuture.pptx
@@ -5,7 +5,7 @@
     <p:sldMasterId id="2147483672" r:id="rId1"/>
   </p:sldMasterIdLst>
   <p:notesMasterIdLst>
-    <p:notesMasterId r:id="rId11"/>
+    <p:notesMasterId r:id="rId12"/>
   </p:notesMasterIdLst>
   <p:sldIdLst>
     <p:sldId id="286" r:id="rId2"/>
@@ -13,10 +13,11 @@
     <p:sldId id="313" r:id="rId4"/>
     <p:sldId id="308" r:id="rId5"/>
     <p:sldId id="314" r:id="rId6"/>
-    <p:sldId id="310" r:id="rId7"/>
-    <p:sldId id="315" r:id="rId8"/>
-    <p:sldId id="263" r:id="rId9"/>
-    <p:sldId id="287" r:id="rId10"/>
+    <p:sldId id="316" r:id="rId7"/>
+    <p:sldId id="310" r:id="rId8"/>
+    <p:sldId id="315" r:id="rId9"/>
+    <p:sldId id="263" r:id="rId10"/>
+    <p:sldId id="287" r:id="rId11"/>
   </p:sldIdLst>
   <p:sldSz cx="12192000" cy="6858000"/>
   <p:notesSz cx="6858000" cy="9144000"/>
@@ -17815,6 +17816,542 @@
 </p:sld>
 </file>
 
+<file path=ppt/slides/slide10.xml><?xml version="1.0" encoding="utf-8"?>
+<p:sld xmlns:a="http://schemas.openxmlformats.org/drawingml/2006/main" xmlns:r="http://schemas.openxmlformats.org/officeDocument/2006/relationships" xmlns:p="http://schemas.openxmlformats.org/presentationml/2006/main">
+  <p:cSld>
+    <p:spTree>
+      <p:nvGrpSpPr>
+        <p:cNvPr id="1" name=""/>
+        <p:cNvGrpSpPr/>
+        <p:nvPr/>
+      </p:nvGrpSpPr>
+      <p:grpSpPr>
+        <a:xfrm>
+          <a:off x="0" y="0"/>
+          <a:ext cx="0" cy="0"/>
+          <a:chOff x="0" y="0"/>
+          <a:chExt cx="0" cy="0"/>
+        </a:xfrm>
+      </p:grpSpPr>
+      <p:pic>
+        <p:nvPicPr>
+          <p:cNvPr id="4" name="Picture 3"/>
+          <p:cNvPicPr>
+            <a:picLocks noChangeAspect="1"/>
+          </p:cNvPicPr>
+          <p:nvPr/>
+        </p:nvPicPr>
+        <p:blipFill>
+          <a:blip r:embed="rId2">
+            <a:extLst>
+              <a:ext uri="{28A0092B-C50C-407E-A947-70E740481C1C}">
+                <a14:useLocalDpi xmlns:a14="http://schemas.microsoft.com/office/drawing/2010/main" val="0"/>
+              </a:ext>
+            </a:extLst>
+          </a:blip>
+          <a:stretch>
+            <a:fillRect/>
+          </a:stretch>
+        </p:blipFill>
+        <p:spPr>
+          <a:xfrm>
+            <a:off x="0" y="0"/>
+            <a:ext cx="12192000" cy="6858000"/>
+          </a:xfrm>
+          <a:prstGeom prst="rect">
+            <a:avLst/>
+          </a:prstGeom>
+        </p:spPr>
+      </p:pic>
+      <p:pic>
+        <p:nvPicPr>
+          <p:cNvPr id="5" name="Picture 2" descr="\\WOOLEYHOMESVR\Photos\MVP_Logo_Kit\MVP Logo Kit\MVP_FullColor_ForScreen.png"/>
+          <p:cNvPicPr>
+            <a:picLocks noChangeAspect="1" noChangeArrowheads="1"/>
+          </p:cNvPicPr>
+          <p:nvPr/>
+        </p:nvPicPr>
+        <p:blipFill>
+          <a:blip r:embed="rId3" cstate="print">
+            <a:extLst>
+              <a:ext uri="{28A0092B-C50C-407E-A947-70E740481C1C}">
+                <a14:useLocalDpi xmlns:a14="http://schemas.microsoft.com/office/drawing/2010/main" val="0"/>
+              </a:ext>
+            </a:extLst>
+          </a:blip>
+          <a:srcRect/>
+          <a:stretch>
+            <a:fillRect/>
+          </a:stretch>
+        </p:blipFill>
+        <p:spPr bwMode="auto">
+          <a:xfrm>
+            <a:off x="10961040" y="12555"/>
+            <a:ext cx="1230960" cy="1931970"/>
+          </a:xfrm>
+          <a:prstGeom prst="rect">
+            <a:avLst/>
+          </a:prstGeom>
+          <a:noFill/>
+          <a:extLst>
+            <a:ext uri="{909E8E84-426E-40DD-AFC4-6F175D3DCCD1}">
+              <a14:hiddenFill xmlns:a14="http://schemas.microsoft.com/office/drawing/2010/main">
+                <a:solidFill>
+                  <a:srgbClr val="FFFFFF"/>
+                </a:solidFill>
+              </a14:hiddenFill>
+            </a:ext>
+          </a:extLst>
+        </p:spPr>
+      </p:pic>
+      <p:pic>
+        <p:nvPicPr>
+          <p:cNvPr id="6" name="Picture 3" descr="\\WOOLEYHOMESVR\Photos\Misc Jims Pictures\LinqInActionCover.jpg"/>
+          <p:cNvPicPr>
+            <a:picLocks noChangeAspect="1" noChangeArrowheads="1"/>
+          </p:cNvPicPr>
+          <p:nvPr/>
+        </p:nvPicPr>
+        <p:blipFill>
+          <a:blip r:embed="rId4">
+            <a:extLst>
+              <a:ext uri="{28A0092B-C50C-407E-A947-70E740481C1C}">
+                <a14:useLocalDpi xmlns:a14="http://schemas.microsoft.com/office/drawing/2010/main" val="0"/>
+              </a:ext>
+            </a:extLst>
+          </a:blip>
+          <a:srcRect/>
+          <a:stretch>
+            <a:fillRect/>
+          </a:stretch>
+        </p:blipFill>
+        <p:spPr bwMode="auto">
+          <a:xfrm>
+            <a:off x="9360840" y="12555"/>
+            <a:ext cx="1600200" cy="2005584"/>
+          </a:xfrm>
+          <a:prstGeom prst="rect">
+            <a:avLst/>
+          </a:prstGeom>
+          <a:noFill/>
+          <a:extLst>
+            <a:ext uri="{909E8E84-426E-40DD-AFC4-6F175D3DCCD1}">
+              <a14:hiddenFill xmlns:a14="http://schemas.microsoft.com/office/drawing/2010/main">
+                <a:solidFill>
+                  <a:srgbClr val="FFFFFF"/>
+                </a:solidFill>
+              </a14:hiddenFill>
+            </a:ext>
+          </a:extLst>
+        </p:spPr>
+      </p:pic>
+      <p:sp>
+        <p:nvSpPr>
+          <p:cNvPr id="7" name="Subtitle 2"/>
+          <p:cNvSpPr txBox="1">
+            <a:spLocks/>
+          </p:cNvSpPr>
+          <p:nvPr/>
+        </p:nvSpPr>
+        <p:spPr>
+          <a:xfrm>
+            <a:off x="76200" y="5410642"/>
+            <a:ext cx="2895600" cy="1368798"/>
+          </a:xfrm>
+          <a:prstGeom prst="rect">
+            <a:avLst/>
+          </a:prstGeom>
+        </p:spPr>
+        <p:style>
+          <a:lnRef idx="0">
+            <a:schemeClr val="dk1"/>
+          </a:lnRef>
+          <a:fillRef idx="3">
+            <a:schemeClr val="dk1"/>
+          </a:fillRef>
+          <a:effectRef idx="3">
+            <a:schemeClr val="dk1"/>
+          </a:effectRef>
+          <a:fontRef idx="minor">
+            <a:schemeClr val="lt1"/>
+          </a:fontRef>
+        </p:style>
+        <p:txBody>
+          <a:bodyPr vert="horz" lIns="91440" tIns="45720" rIns="91440" bIns="45720" rtlCol="0">
+            <a:normAutofit/>
+          </a:bodyPr>
+          <a:lstStyle>
+            <a:lvl1pPr marL="0" indent="0" algn="l" defTabSz="914400" rtl="0" eaLnBrk="1" latinLnBrk="0" hangingPunct="1">
+              <a:spcBef>
+                <a:spcPct val="20000"/>
+              </a:spcBef>
+              <a:buClr>
+                <a:schemeClr val="accent1">
+                  <a:lumMod val="60000"/>
+                  <a:lumOff val="40000"/>
+                </a:schemeClr>
+              </a:buClr>
+              <a:buFont typeface="Arial" pitchFamily="34" charset="0"/>
+              <a:buNone/>
+              <a:defRPr sz="2200" kern="1200">
+                <a:solidFill>
+                  <a:srgbClr val="FFFFFF"/>
+                </a:solidFill>
+                <a:latin typeface="+mn-lt"/>
+                <a:ea typeface="+mn-ea"/>
+                <a:cs typeface="+mn-cs"/>
+              </a:defRPr>
+            </a:lvl1pPr>
+            <a:lvl2pPr marL="457200" indent="0" algn="ctr" defTabSz="914400" rtl="0" eaLnBrk="1" latinLnBrk="0" hangingPunct="1">
+              <a:spcBef>
+                <a:spcPct val="20000"/>
+              </a:spcBef>
+              <a:buClr>
+                <a:schemeClr val="accent1">
+                  <a:lumMod val="60000"/>
+                  <a:lumOff val="40000"/>
+                </a:schemeClr>
+              </a:buClr>
+              <a:buFont typeface="Arial" pitchFamily="34" charset="0"/>
+              <a:buNone/>
+              <a:defRPr sz="2000" kern="1200">
+                <a:solidFill>
+                  <a:schemeClr val="tx1">
+                    <a:tint val="75000"/>
+                  </a:schemeClr>
+                </a:solidFill>
+                <a:latin typeface="+mn-lt"/>
+                <a:ea typeface="+mn-ea"/>
+                <a:cs typeface="+mn-cs"/>
+              </a:defRPr>
+            </a:lvl2pPr>
+            <a:lvl3pPr marL="914400" indent="0" algn="ctr" defTabSz="914400" rtl="0" eaLnBrk="1" latinLnBrk="0" hangingPunct="1">
+              <a:spcBef>
+                <a:spcPct val="20000"/>
+              </a:spcBef>
+              <a:buClr>
+                <a:schemeClr val="accent2"/>
+              </a:buClr>
+              <a:buFont typeface="Arial" pitchFamily="34" charset="0"/>
+              <a:buNone/>
+              <a:defRPr sz="2000" kern="1200">
+                <a:solidFill>
+                  <a:schemeClr val="tx1">
+                    <a:tint val="75000"/>
+                  </a:schemeClr>
+                </a:solidFill>
+                <a:latin typeface="+mn-lt"/>
+                <a:ea typeface="+mn-ea"/>
+                <a:cs typeface="+mn-cs"/>
+              </a:defRPr>
+            </a:lvl3pPr>
+            <a:lvl4pPr marL="1371600" indent="0" algn="ctr" defTabSz="914400" rtl="0" eaLnBrk="1" latinLnBrk="0" hangingPunct="1">
+              <a:spcBef>
+                <a:spcPct val="20000"/>
+              </a:spcBef>
+              <a:buClr>
+                <a:schemeClr val="accent3"/>
+              </a:buClr>
+              <a:buFont typeface="Arial" pitchFamily="34" charset="0"/>
+              <a:buNone/>
+              <a:defRPr sz="1800" kern="1200">
+                <a:solidFill>
+                  <a:schemeClr val="tx1">
+                    <a:tint val="75000"/>
+                  </a:schemeClr>
+                </a:solidFill>
+                <a:latin typeface="+mn-lt"/>
+                <a:ea typeface="+mn-ea"/>
+                <a:cs typeface="+mn-cs"/>
+              </a:defRPr>
+            </a:lvl4pPr>
+            <a:lvl5pPr marL="1828800" indent="0" algn="ctr" defTabSz="914400" rtl="0" eaLnBrk="1" latinLnBrk="0" hangingPunct="1">
+              <a:spcBef>
+                <a:spcPct val="20000"/>
+              </a:spcBef>
+              <a:buClr>
+                <a:schemeClr val="accent4"/>
+              </a:buClr>
+              <a:buFont typeface="Arial" pitchFamily="34" charset="0"/>
+              <a:buNone/>
+              <a:defRPr sz="1600" kern="1200" baseline="0">
+                <a:solidFill>
+                  <a:schemeClr val="tx1">
+                    <a:tint val="75000"/>
+                  </a:schemeClr>
+                </a:solidFill>
+                <a:latin typeface="+mn-lt"/>
+                <a:ea typeface="+mn-ea"/>
+                <a:cs typeface="+mn-cs"/>
+              </a:defRPr>
+            </a:lvl5pPr>
+            <a:lvl6pPr marL="2286000" indent="0" algn="ctr" defTabSz="914400" rtl="0" eaLnBrk="1" latinLnBrk="0" hangingPunct="1">
+              <a:spcBef>
+                <a:spcPct val="20000"/>
+              </a:spcBef>
+              <a:buClr>
+                <a:schemeClr val="accent5"/>
+              </a:buClr>
+              <a:buFont typeface="Arial" pitchFamily="34" charset="0"/>
+              <a:buNone/>
+              <a:defRPr sz="1600" kern="1200">
+                <a:solidFill>
+                  <a:schemeClr val="tx1">
+                    <a:tint val="75000"/>
+                  </a:schemeClr>
+                </a:solidFill>
+                <a:latin typeface="+mn-lt"/>
+                <a:ea typeface="+mn-ea"/>
+                <a:cs typeface="+mn-cs"/>
+              </a:defRPr>
+            </a:lvl6pPr>
+            <a:lvl7pPr marL="2743200" indent="0" algn="ctr" defTabSz="914400" rtl="0" eaLnBrk="1" latinLnBrk="0" hangingPunct="1">
+              <a:spcBef>
+                <a:spcPct val="20000"/>
+              </a:spcBef>
+              <a:buClr>
+                <a:schemeClr val="accent6"/>
+              </a:buClr>
+              <a:buFont typeface="Arial" pitchFamily="34" charset="0"/>
+              <a:buNone/>
+              <a:defRPr sz="1600" kern="1200">
+                <a:solidFill>
+                  <a:schemeClr val="tx1">
+                    <a:tint val="75000"/>
+                  </a:schemeClr>
+                </a:solidFill>
+                <a:latin typeface="+mn-lt"/>
+                <a:ea typeface="+mn-ea"/>
+                <a:cs typeface="+mn-cs"/>
+              </a:defRPr>
+            </a:lvl7pPr>
+            <a:lvl8pPr marL="3200400" indent="0" algn="ctr" defTabSz="914400" rtl="0" eaLnBrk="1" latinLnBrk="0" hangingPunct="1">
+              <a:spcBef>
+                <a:spcPct val="20000"/>
+              </a:spcBef>
+              <a:buClr>
+                <a:schemeClr val="accent3"/>
+              </a:buClr>
+              <a:buFont typeface="Arial" pitchFamily="34" charset="0"/>
+              <a:buNone/>
+              <a:defRPr sz="1600" kern="1200">
+                <a:solidFill>
+                  <a:schemeClr val="tx1">
+                    <a:tint val="75000"/>
+                  </a:schemeClr>
+                </a:solidFill>
+                <a:latin typeface="+mn-lt"/>
+                <a:ea typeface="+mn-ea"/>
+                <a:cs typeface="+mn-cs"/>
+              </a:defRPr>
+            </a:lvl8pPr>
+            <a:lvl9pPr marL="3657600" indent="0" algn="ctr" defTabSz="914400" rtl="0" eaLnBrk="1" latinLnBrk="0" hangingPunct="1">
+              <a:spcBef>
+                <a:spcPct val="20000"/>
+              </a:spcBef>
+              <a:buClr>
+                <a:schemeClr val="accent6"/>
+              </a:buClr>
+              <a:buFont typeface="Arial" pitchFamily="34" charset="0"/>
+              <a:buNone/>
+              <a:defRPr sz="1600" kern="1200">
+                <a:solidFill>
+                  <a:schemeClr val="tx1">
+                    <a:tint val="75000"/>
+                  </a:schemeClr>
+                </a:solidFill>
+                <a:latin typeface="+mn-lt"/>
+                <a:ea typeface="+mn-ea"/>
+                <a:cs typeface="+mn-cs"/>
+              </a:defRPr>
+            </a:lvl9pPr>
+          </a:lstStyle>
+          <a:p>
+            <a:pPr algn="r"/>
+            <a:r>
+              <a:rPr lang="en-US" dirty="0"/>
+              <a:t>Jim Wooley</a:t>
+            </a:r>
+          </a:p>
+          <a:p>
+            <a:pPr algn="r"/>
+            <a:r>
+              <a:rPr lang="en-US" dirty="0">
+                <a:hlinkClick r:id="rId5"/>
+              </a:rPr>
+              <a:t>www.ThinqLinq.com</a:t>
+            </a:r>
+            <a:endParaRPr lang="en-US" dirty="0"/>
+          </a:p>
+          <a:p>
+            <a:pPr algn="r"/>
+            <a:r>
+              <a:rPr lang="en-US" dirty="0"/>
+              <a:t>Twitter: @</a:t>
+            </a:r>
+            <a:r>
+              <a:rPr lang="en-US" dirty="0" err="1"/>
+              <a:t>JimWooley</a:t>
+            </a:r>
+            <a:endParaRPr lang="en-US" dirty="0"/>
+          </a:p>
+        </p:txBody>
+      </p:sp>
+      <p:sp>
+        <p:nvSpPr>
+          <p:cNvPr id="11" name="Title 1"/>
+          <p:cNvSpPr>
+            <a:spLocks noGrp="1"/>
+          </p:cNvSpPr>
+          <p:nvPr>
+            <p:ph type="ctrTitle"/>
+          </p:nvPr>
+        </p:nvSpPr>
+        <p:spPr>
+          <a:xfrm>
+            <a:off x="2590800" y="2133600"/>
+            <a:ext cx="7848600" cy="2362200"/>
+          </a:xfrm>
+          <a:solidFill>
+            <a:srgbClr val="000000">
+              <a:alpha val="69804"/>
+            </a:srgbClr>
+          </a:solidFill>
+          <a:effectLst>
+            <a:softEdge rad="63500"/>
+          </a:effectLst>
+        </p:spPr>
+        <p:style>
+          <a:lnRef idx="1">
+            <a:schemeClr val="accent1"/>
+          </a:lnRef>
+          <a:fillRef idx="2">
+            <a:schemeClr val="accent1"/>
+          </a:fillRef>
+          <a:effectRef idx="1">
+            <a:schemeClr val="accent1"/>
+          </a:effectRef>
+          <a:fontRef idx="minor">
+            <a:schemeClr val="dk1"/>
+          </a:fontRef>
+        </p:style>
+        <p:txBody>
+          <a:bodyPr anchor="ctr">
+            <a:normAutofit fontScale="90000"/>
+          </a:bodyPr>
+          <a:lstStyle/>
+          <a:p>
+            <a:pPr algn="ctr"/>
+            <a:r>
+              <a:rPr lang="en-US" cap="small" dirty="0" err="1">
+                <a:solidFill>
+                  <a:schemeClr val="tx1"/>
+                </a:solidFill>
+              </a:rPr>
+              <a:t>.Net</a:t>
+            </a:r>
+            <a:r>
+              <a:rPr lang="en-US" cap="small" dirty="0">
+                <a:solidFill>
+                  <a:schemeClr val="tx1"/>
+                </a:solidFill>
+              </a:rPr>
+              <a:t> Compiler Platform</a:t>
+            </a:r>
+            <a:br>
+              <a:rPr lang="en-US" cap="small" dirty="0">
+                <a:solidFill>
+                  <a:schemeClr val="tx1"/>
+                </a:solidFill>
+              </a:rPr>
+            </a:br>
+            <a:r>
+              <a:rPr lang="en-US" cap="small" dirty="0">
+                <a:solidFill>
+                  <a:schemeClr val="tx1"/>
+                </a:solidFill>
+              </a:rPr>
+              <a:t>(Roslyn)</a:t>
+            </a:r>
+            <a:br>
+              <a:rPr lang="en-US" cap="small" dirty="0">
+                <a:solidFill>
+                  <a:schemeClr val="tx1"/>
+                </a:solidFill>
+              </a:rPr>
+            </a:br>
+            <a:r>
+              <a:rPr lang="en-US" cap="small" dirty="0">
+                <a:solidFill>
+                  <a:schemeClr val="tx1"/>
+                </a:solidFill>
+              </a:rPr>
+              <a:t>And You</a:t>
+            </a:r>
+            <a:br>
+              <a:rPr lang="en-US" cap="small" dirty="0">
+                <a:solidFill>
+                  <a:schemeClr val="tx1"/>
+                </a:solidFill>
+              </a:rPr>
+            </a:br>
+            <a:r>
+              <a:rPr lang="en-US" sz="2200" dirty="0">
+                <a:solidFill>
+                  <a:schemeClr val="tx1"/>
+                </a:solidFill>
+                <a:latin typeface="Segoe UI" panose="020B0502040204020203" pitchFamily="34" charset="0"/>
+                <a:hlinkClick r:id="rId6"/>
+              </a:rPr>
+              <a:t>https://github.com/jwooley/RoslynAndYou</a:t>
+            </a:r>
+            <a:br>
+              <a:rPr lang="en-US" sz="2200" dirty="0">
+                <a:solidFill>
+                  <a:schemeClr val="tx1"/>
+                </a:solidFill>
+                <a:latin typeface="Segoe UI" panose="020B0502040204020203" pitchFamily="34" charset="0"/>
+              </a:rPr>
+            </a:br>
+            <a:r>
+              <a:rPr lang="en-US" sz="2400" dirty="0">
+                <a:solidFill>
+                  <a:schemeClr val="tx1"/>
+                </a:solidFill>
+                <a:hlinkClick r:id="rId7"/>
+              </a:rPr>
+              <a:t>https://jwooley.github.io</a:t>
+            </a:r>
+            <a:r>
+              <a:rPr lang="en-US" sz="2400" cap="small" dirty="0">
+                <a:solidFill>
+                  <a:schemeClr val="tx1"/>
+                </a:solidFill>
+                <a:hlinkClick r:id="rId7"/>
+              </a:rPr>
+              <a:t>/</a:t>
+            </a:r>
+            <a:endParaRPr lang="en-US" sz="2200" cap="small" dirty="0">
+              <a:solidFill>
+                <a:schemeClr val="tx1"/>
+              </a:solidFill>
+            </a:endParaRPr>
+          </a:p>
+        </p:txBody>
+      </p:sp>
+    </p:spTree>
+    <p:extLst>
+      <p:ext uri="{BB962C8B-B14F-4D97-AF65-F5344CB8AC3E}">
+        <p14:creationId xmlns:p14="http://schemas.microsoft.com/office/powerpoint/2010/main" val="2613547704"/>
+      </p:ext>
+    </p:extLst>
+  </p:cSld>
+  <p:clrMapOvr>
+    <a:masterClrMapping/>
+  </p:clrMapOvr>
+</p:sld>
+</file>
+
 <file path=ppt/slides/slide2.xml><?xml version="1.0" encoding="utf-8"?>
 <p:sld xmlns:a="http://schemas.openxmlformats.org/drawingml/2006/main" xmlns:r="http://schemas.openxmlformats.org/officeDocument/2006/relationships" xmlns:p="http://schemas.openxmlformats.org/presentationml/2006/main">
   <p:cSld>
@@ -17856,7 +18393,7 @@
           <a:graphicData uri="http://schemas.openxmlformats.org/presentationml/2006/ole">
             <mc:AlternateContent xmlns:mc="http://schemas.openxmlformats.org/markup-compatibility/2006">
               <mc:Choice xmlns:v="urn:schemas-microsoft-com:vml" Requires="v">
-                <p:oleObj spid="_x0000_s1028" r:id="rId3" imgW="11694960" imgH="9847440" progId="">
+                <p:oleObj spid="_x0000_s1029" r:id="rId3" imgW="11694960" imgH="9847440" progId="">
                   <p:embed/>
                 </p:oleObj>
               </mc:Choice>
@@ -25577,6 +26114,86 @@
       </p:grpSpPr>
       <p:sp>
         <p:nvSpPr>
+          <p:cNvPr id="2" name="Title 1">
+            <a:extLst>
+              <a:ext uri="{FF2B5EF4-FFF2-40B4-BE49-F238E27FC236}">
+                <a16:creationId xmlns:a16="http://schemas.microsoft.com/office/drawing/2014/main" id="{F193A8D0-CF8E-4923-BF65-4AF4D47116B9}"/>
+              </a:ext>
+            </a:extLst>
+          </p:cNvPr>
+          <p:cNvSpPr>
+            <a:spLocks noGrp="1"/>
+          </p:cNvSpPr>
+          <p:nvPr>
+            <p:ph type="title"/>
+          </p:nvPr>
+        </p:nvSpPr>
+        <p:spPr/>
+        <p:txBody>
+          <a:bodyPr/>
+          <a:lstStyle/>
+          <a:p>
+            <a:endParaRPr lang="en-US"/>
+          </a:p>
+        </p:txBody>
+      </p:sp>
+      <p:sp>
+        <p:nvSpPr>
+          <p:cNvPr id="3" name="Content Placeholder 2">
+            <a:extLst>
+              <a:ext uri="{FF2B5EF4-FFF2-40B4-BE49-F238E27FC236}">
+                <a16:creationId xmlns:a16="http://schemas.microsoft.com/office/drawing/2014/main" id="{C1E52E38-E0EE-45D9-B4A8-AFF2F4183D9A}"/>
+              </a:ext>
+            </a:extLst>
+          </p:cNvPr>
+          <p:cNvSpPr>
+            <a:spLocks noGrp="1"/>
+          </p:cNvSpPr>
+          <p:nvPr>
+            <p:ph idx="1"/>
+          </p:nvPr>
+        </p:nvSpPr>
+        <p:spPr/>
+        <p:txBody>
+          <a:bodyPr/>
+          <a:lstStyle/>
+          <a:p>
+            <a:endParaRPr lang="en-US"/>
+          </a:p>
+        </p:txBody>
+      </p:sp>
+    </p:spTree>
+    <p:extLst>
+      <p:ext uri="{BB962C8B-B14F-4D97-AF65-F5344CB8AC3E}">
+        <p14:creationId xmlns:p14="http://schemas.microsoft.com/office/powerpoint/2010/main" val="4078815954"/>
+      </p:ext>
+    </p:extLst>
+  </p:cSld>
+  <p:clrMapOvr>
+    <a:masterClrMapping/>
+  </p:clrMapOvr>
+</p:sld>
+</file>
+
+<file path=ppt/slides/slide7.xml><?xml version="1.0" encoding="utf-8"?>
+<p:sld xmlns:a="http://schemas.openxmlformats.org/drawingml/2006/main" xmlns:r="http://schemas.openxmlformats.org/officeDocument/2006/relationships" xmlns:p="http://schemas.openxmlformats.org/presentationml/2006/main">
+  <p:cSld>
+    <p:spTree>
+      <p:nvGrpSpPr>
+        <p:cNvPr id="1" name=""/>
+        <p:cNvGrpSpPr/>
+        <p:nvPr/>
+      </p:nvGrpSpPr>
+      <p:grpSpPr>
+        <a:xfrm>
+          <a:off x="0" y="0"/>
+          <a:ext cx="0" cy="0"/>
+          <a:chOff x="0" y="0"/>
+          <a:chExt cx="0" cy="0"/>
+        </a:xfrm>
+      </p:grpSpPr>
+      <p:sp>
+        <p:nvSpPr>
           <p:cNvPr id="3" name="Content Placeholder 2"/>
           <p:cNvSpPr>
             <a:spLocks noGrp="1"/>
@@ -27683,7 +28300,7 @@
 </p:sld>
 </file>
 
-<file path=ppt/slides/slide7.xml><?xml version="1.0" encoding="utf-8"?>
+<file path=ppt/slides/slide8.xml><?xml version="1.0" encoding="utf-8"?>
 <p:sld xmlns:a="http://schemas.openxmlformats.org/drawingml/2006/main" xmlns:r="http://schemas.openxmlformats.org/officeDocument/2006/relationships" xmlns:p="http://schemas.openxmlformats.org/presentationml/2006/main">
   <p:cSld>
     <p:spTree>
@@ -27816,7 +28433,7 @@
 </p:sld>
 </file>
 
-<file path=ppt/slides/slide8.xml><?xml version="1.0" encoding="utf-8"?>
+<file path=ppt/slides/slide9.xml><?xml version="1.0" encoding="utf-8"?>
 <p:sld xmlns:a="http://schemas.openxmlformats.org/drawingml/2006/main" xmlns:r="http://schemas.openxmlformats.org/officeDocument/2006/relationships" xmlns:p="http://schemas.openxmlformats.org/presentationml/2006/main">
   <p:cSld>
     <p:spTree>
@@ -28116,542 +28733,6 @@
     <p:extLst>
       <p:ext uri="{BB962C8B-B14F-4D97-AF65-F5344CB8AC3E}">
         <p14:creationId xmlns:p14="http://schemas.microsoft.com/office/powerpoint/2010/main" val="2537536581"/>
-      </p:ext>
-    </p:extLst>
-  </p:cSld>
-  <p:clrMapOvr>
-    <a:masterClrMapping/>
-  </p:clrMapOvr>
-</p:sld>
-</file>
-
-<file path=ppt/slides/slide9.xml><?xml version="1.0" encoding="utf-8"?>
-<p:sld xmlns:a="http://schemas.openxmlformats.org/drawingml/2006/main" xmlns:r="http://schemas.openxmlformats.org/officeDocument/2006/relationships" xmlns:p="http://schemas.openxmlformats.org/presentationml/2006/main">
-  <p:cSld>
-    <p:spTree>
-      <p:nvGrpSpPr>
-        <p:cNvPr id="1" name=""/>
-        <p:cNvGrpSpPr/>
-        <p:nvPr/>
-      </p:nvGrpSpPr>
-      <p:grpSpPr>
-        <a:xfrm>
-          <a:off x="0" y="0"/>
-          <a:ext cx="0" cy="0"/>
-          <a:chOff x="0" y="0"/>
-          <a:chExt cx="0" cy="0"/>
-        </a:xfrm>
-      </p:grpSpPr>
-      <p:pic>
-        <p:nvPicPr>
-          <p:cNvPr id="4" name="Picture 3"/>
-          <p:cNvPicPr>
-            <a:picLocks noChangeAspect="1"/>
-          </p:cNvPicPr>
-          <p:nvPr/>
-        </p:nvPicPr>
-        <p:blipFill>
-          <a:blip r:embed="rId2">
-            <a:extLst>
-              <a:ext uri="{28A0092B-C50C-407E-A947-70E740481C1C}">
-                <a14:useLocalDpi xmlns:a14="http://schemas.microsoft.com/office/drawing/2010/main" val="0"/>
-              </a:ext>
-            </a:extLst>
-          </a:blip>
-          <a:stretch>
-            <a:fillRect/>
-          </a:stretch>
-        </p:blipFill>
-        <p:spPr>
-          <a:xfrm>
-            <a:off x="0" y="0"/>
-            <a:ext cx="12192000" cy="6858000"/>
-          </a:xfrm>
-          <a:prstGeom prst="rect">
-            <a:avLst/>
-          </a:prstGeom>
-        </p:spPr>
-      </p:pic>
-      <p:pic>
-        <p:nvPicPr>
-          <p:cNvPr id="5" name="Picture 2" descr="\\WOOLEYHOMESVR\Photos\MVP_Logo_Kit\MVP Logo Kit\MVP_FullColor_ForScreen.png"/>
-          <p:cNvPicPr>
-            <a:picLocks noChangeAspect="1" noChangeArrowheads="1"/>
-          </p:cNvPicPr>
-          <p:nvPr/>
-        </p:nvPicPr>
-        <p:blipFill>
-          <a:blip r:embed="rId3" cstate="print">
-            <a:extLst>
-              <a:ext uri="{28A0092B-C50C-407E-A947-70E740481C1C}">
-                <a14:useLocalDpi xmlns:a14="http://schemas.microsoft.com/office/drawing/2010/main" val="0"/>
-              </a:ext>
-            </a:extLst>
-          </a:blip>
-          <a:srcRect/>
-          <a:stretch>
-            <a:fillRect/>
-          </a:stretch>
-        </p:blipFill>
-        <p:spPr bwMode="auto">
-          <a:xfrm>
-            <a:off x="10961040" y="12555"/>
-            <a:ext cx="1230960" cy="1931970"/>
-          </a:xfrm>
-          <a:prstGeom prst="rect">
-            <a:avLst/>
-          </a:prstGeom>
-          <a:noFill/>
-          <a:extLst>
-            <a:ext uri="{909E8E84-426E-40DD-AFC4-6F175D3DCCD1}">
-              <a14:hiddenFill xmlns:a14="http://schemas.microsoft.com/office/drawing/2010/main">
-                <a:solidFill>
-                  <a:srgbClr val="FFFFFF"/>
-                </a:solidFill>
-              </a14:hiddenFill>
-            </a:ext>
-          </a:extLst>
-        </p:spPr>
-      </p:pic>
-      <p:pic>
-        <p:nvPicPr>
-          <p:cNvPr id="6" name="Picture 3" descr="\\WOOLEYHOMESVR\Photos\Misc Jims Pictures\LinqInActionCover.jpg"/>
-          <p:cNvPicPr>
-            <a:picLocks noChangeAspect="1" noChangeArrowheads="1"/>
-          </p:cNvPicPr>
-          <p:nvPr/>
-        </p:nvPicPr>
-        <p:blipFill>
-          <a:blip r:embed="rId4">
-            <a:extLst>
-              <a:ext uri="{28A0092B-C50C-407E-A947-70E740481C1C}">
-                <a14:useLocalDpi xmlns:a14="http://schemas.microsoft.com/office/drawing/2010/main" val="0"/>
-              </a:ext>
-            </a:extLst>
-          </a:blip>
-          <a:srcRect/>
-          <a:stretch>
-            <a:fillRect/>
-          </a:stretch>
-        </p:blipFill>
-        <p:spPr bwMode="auto">
-          <a:xfrm>
-            <a:off x="9360840" y="12555"/>
-            <a:ext cx="1600200" cy="2005584"/>
-          </a:xfrm>
-          <a:prstGeom prst="rect">
-            <a:avLst/>
-          </a:prstGeom>
-          <a:noFill/>
-          <a:extLst>
-            <a:ext uri="{909E8E84-426E-40DD-AFC4-6F175D3DCCD1}">
-              <a14:hiddenFill xmlns:a14="http://schemas.microsoft.com/office/drawing/2010/main">
-                <a:solidFill>
-                  <a:srgbClr val="FFFFFF"/>
-                </a:solidFill>
-              </a14:hiddenFill>
-            </a:ext>
-          </a:extLst>
-        </p:spPr>
-      </p:pic>
-      <p:sp>
-        <p:nvSpPr>
-          <p:cNvPr id="7" name="Subtitle 2"/>
-          <p:cNvSpPr txBox="1">
-            <a:spLocks/>
-          </p:cNvSpPr>
-          <p:nvPr/>
-        </p:nvSpPr>
-        <p:spPr>
-          <a:xfrm>
-            <a:off x="76200" y="5410642"/>
-            <a:ext cx="2895600" cy="1368798"/>
-          </a:xfrm>
-          <a:prstGeom prst="rect">
-            <a:avLst/>
-          </a:prstGeom>
-        </p:spPr>
-        <p:style>
-          <a:lnRef idx="0">
-            <a:schemeClr val="dk1"/>
-          </a:lnRef>
-          <a:fillRef idx="3">
-            <a:schemeClr val="dk1"/>
-          </a:fillRef>
-          <a:effectRef idx="3">
-            <a:schemeClr val="dk1"/>
-          </a:effectRef>
-          <a:fontRef idx="minor">
-            <a:schemeClr val="lt1"/>
-          </a:fontRef>
-        </p:style>
-        <p:txBody>
-          <a:bodyPr vert="horz" lIns="91440" tIns="45720" rIns="91440" bIns="45720" rtlCol="0">
-            <a:normAutofit/>
-          </a:bodyPr>
-          <a:lstStyle>
-            <a:lvl1pPr marL="0" indent="0" algn="l" defTabSz="914400" rtl="0" eaLnBrk="1" latinLnBrk="0" hangingPunct="1">
-              <a:spcBef>
-                <a:spcPct val="20000"/>
-              </a:spcBef>
-              <a:buClr>
-                <a:schemeClr val="accent1">
-                  <a:lumMod val="60000"/>
-                  <a:lumOff val="40000"/>
-                </a:schemeClr>
-              </a:buClr>
-              <a:buFont typeface="Arial" pitchFamily="34" charset="0"/>
-              <a:buNone/>
-              <a:defRPr sz="2200" kern="1200">
-                <a:solidFill>
-                  <a:srgbClr val="FFFFFF"/>
-                </a:solidFill>
-                <a:latin typeface="+mn-lt"/>
-                <a:ea typeface="+mn-ea"/>
-                <a:cs typeface="+mn-cs"/>
-              </a:defRPr>
-            </a:lvl1pPr>
-            <a:lvl2pPr marL="457200" indent="0" algn="ctr" defTabSz="914400" rtl="0" eaLnBrk="1" latinLnBrk="0" hangingPunct="1">
-              <a:spcBef>
-                <a:spcPct val="20000"/>
-              </a:spcBef>
-              <a:buClr>
-                <a:schemeClr val="accent1">
-                  <a:lumMod val="60000"/>
-                  <a:lumOff val="40000"/>
-                </a:schemeClr>
-              </a:buClr>
-              <a:buFont typeface="Arial" pitchFamily="34" charset="0"/>
-              <a:buNone/>
-              <a:defRPr sz="2000" kern="1200">
-                <a:solidFill>
-                  <a:schemeClr val="tx1">
-                    <a:tint val="75000"/>
-                  </a:schemeClr>
-                </a:solidFill>
-                <a:latin typeface="+mn-lt"/>
-                <a:ea typeface="+mn-ea"/>
-                <a:cs typeface="+mn-cs"/>
-              </a:defRPr>
-            </a:lvl2pPr>
-            <a:lvl3pPr marL="914400" indent="0" algn="ctr" defTabSz="914400" rtl="0" eaLnBrk="1" latinLnBrk="0" hangingPunct="1">
-              <a:spcBef>
-                <a:spcPct val="20000"/>
-              </a:spcBef>
-              <a:buClr>
-                <a:schemeClr val="accent2"/>
-              </a:buClr>
-              <a:buFont typeface="Arial" pitchFamily="34" charset="0"/>
-              <a:buNone/>
-              <a:defRPr sz="2000" kern="1200">
-                <a:solidFill>
-                  <a:schemeClr val="tx1">
-                    <a:tint val="75000"/>
-                  </a:schemeClr>
-                </a:solidFill>
-                <a:latin typeface="+mn-lt"/>
-                <a:ea typeface="+mn-ea"/>
-                <a:cs typeface="+mn-cs"/>
-              </a:defRPr>
-            </a:lvl3pPr>
-            <a:lvl4pPr marL="1371600" indent="0" algn="ctr" defTabSz="914400" rtl="0" eaLnBrk="1" latinLnBrk="0" hangingPunct="1">
-              <a:spcBef>
-                <a:spcPct val="20000"/>
-              </a:spcBef>
-              <a:buClr>
-                <a:schemeClr val="accent3"/>
-              </a:buClr>
-              <a:buFont typeface="Arial" pitchFamily="34" charset="0"/>
-              <a:buNone/>
-              <a:defRPr sz="1800" kern="1200">
-                <a:solidFill>
-                  <a:schemeClr val="tx1">
-                    <a:tint val="75000"/>
-                  </a:schemeClr>
-                </a:solidFill>
-                <a:latin typeface="+mn-lt"/>
-                <a:ea typeface="+mn-ea"/>
-                <a:cs typeface="+mn-cs"/>
-              </a:defRPr>
-            </a:lvl4pPr>
-            <a:lvl5pPr marL="1828800" indent="0" algn="ctr" defTabSz="914400" rtl="0" eaLnBrk="1" latinLnBrk="0" hangingPunct="1">
-              <a:spcBef>
-                <a:spcPct val="20000"/>
-              </a:spcBef>
-              <a:buClr>
-                <a:schemeClr val="accent4"/>
-              </a:buClr>
-              <a:buFont typeface="Arial" pitchFamily="34" charset="0"/>
-              <a:buNone/>
-              <a:defRPr sz="1600" kern="1200" baseline="0">
-                <a:solidFill>
-                  <a:schemeClr val="tx1">
-                    <a:tint val="75000"/>
-                  </a:schemeClr>
-                </a:solidFill>
-                <a:latin typeface="+mn-lt"/>
-                <a:ea typeface="+mn-ea"/>
-                <a:cs typeface="+mn-cs"/>
-              </a:defRPr>
-            </a:lvl5pPr>
-            <a:lvl6pPr marL="2286000" indent="0" algn="ctr" defTabSz="914400" rtl="0" eaLnBrk="1" latinLnBrk="0" hangingPunct="1">
-              <a:spcBef>
-                <a:spcPct val="20000"/>
-              </a:spcBef>
-              <a:buClr>
-                <a:schemeClr val="accent5"/>
-              </a:buClr>
-              <a:buFont typeface="Arial" pitchFamily="34" charset="0"/>
-              <a:buNone/>
-              <a:defRPr sz="1600" kern="1200">
-                <a:solidFill>
-                  <a:schemeClr val="tx1">
-                    <a:tint val="75000"/>
-                  </a:schemeClr>
-                </a:solidFill>
-                <a:latin typeface="+mn-lt"/>
-                <a:ea typeface="+mn-ea"/>
-                <a:cs typeface="+mn-cs"/>
-              </a:defRPr>
-            </a:lvl6pPr>
-            <a:lvl7pPr marL="2743200" indent="0" algn="ctr" defTabSz="914400" rtl="0" eaLnBrk="1" latinLnBrk="0" hangingPunct="1">
-              <a:spcBef>
-                <a:spcPct val="20000"/>
-              </a:spcBef>
-              <a:buClr>
-                <a:schemeClr val="accent6"/>
-              </a:buClr>
-              <a:buFont typeface="Arial" pitchFamily="34" charset="0"/>
-              <a:buNone/>
-              <a:defRPr sz="1600" kern="1200">
-                <a:solidFill>
-                  <a:schemeClr val="tx1">
-                    <a:tint val="75000"/>
-                  </a:schemeClr>
-                </a:solidFill>
-                <a:latin typeface="+mn-lt"/>
-                <a:ea typeface="+mn-ea"/>
-                <a:cs typeface="+mn-cs"/>
-              </a:defRPr>
-            </a:lvl7pPr>
-            <a:lvl8pPr marL="3200400" indent="0" algn="ctr" defTabSz="914400" rtl="0" eaLnBrk="1" latinLnBrk="0" hangingPunct="1">
-              <a:spcBef>
-                <a:spcPct val="20000"/>
-              </a:spcBef>
-              <a:buClr>
-                <a:schemeClr val="accent3"/>
-              </a:buClr>
-              <a:buFont typeface="Arial" pitchFamily="34" charset="0"/>
-              <a:buNone/>
-              <a:defRPr sz="1600" kern="1200">
-                <a:solidFill>
-                  <a:schemeClr val="tx1">
-                    <a:tint val="75000"/>
-                  </a:schemeClr>
-                </a:solidFill>
-                <a:latin typeface="+mn-lt"/>
-                <a:ea typeface="+mn-ea"/>
-                <a:cs typeface="+mn-cs"/>
-              </a:defRPr>
-            </a:lvl8pPr>
-            <a:lvl9pPr marL="3657600" indent="0" algn="ctr" defTabSz="914400" rtl="0" eaLnBrk="1" latinLnBrk="0" hangingPunct="1">
-              <a:spcBef>
-                <a:spcPct val="20000"/>
-              </a:spcBef>
-              <a:buClr>
-                <a:schemeClr val="accent6"/>
-              </a:buClr>
-              <a:buFont typeface="Arial" pitchFamily="34" charset="0"/>
-              <a:buNone/>
-              <a:defRPr sz="1600" kern="1200">
-                <a:solidFill>
-                  <a:schemeClr val="tx1">
-                    <a:tint val="75000"/>
-                  </a:schemeClr>
-                </a:solidFill>
-                <a:latin typeface="+mn-lt"/>
-                <a:ea typeface="+mn-ea"/>
-                <a:cs typeface="+mn-cs"/>
-              </a:defRPr>
-            </a:lvl9pPr>
-          </a:lstStyle>
-          <a:p>
-            <a:pPr algn="r"/>
-            <a:r>
-              <a:rPr lang="en-US" dirty="0"/>
-              <a:t>Jim Wooley</a:t>
-            </a:r>
-          </a:p>
-          <a:p>
-            <a:pPr algn="r"/>
-            <a:r>
-              <a:rPr lang="en-US" dirty="0">
-                <a:hlinkClick r:id="rId5"/>
-              </a:rPr>
-              <a:t>www.ThinqLinq.com</a:t>
-            </a:r>
-            <a:endParaRPr lang="en-US" dirty="0"/>
-          </a:p>
-          <a:p>
-            <a:pPr algn="r"/>
-            <a:r>
-              <a:rPr lang="en-US" dirty="0"/>
-              <a:t>Twitter: @</a:t>
-            </a:r>
-            <a:r>
-              <a:rPr lang="en-US" dirty="0" err="1"/>
-              <a:t>JimWooley</a:t>
-            </a:r>
-            <a:endParaRPr lang="en-US" dirty="0"/>
-          </a:p>
-        </p:txBody>
-      </p:sp>
-      <p:sp>
-        <p:nvSpPr>
-          <p:cNvPr id="11" name="Title 1"/>
-          <p:cNvSpPr>
-            <a:spLocks noGrp="1"/>
-          </p:cNvSpPr>
-          <p:nvPr>
-            <p:ph type="ctrTitle"/>
-          </p:nvPr>
-        </p:nvSpPr>
-        <p:spPr>
-          <a:xfrm>
-            <a:off x="2590800" y="2133600"/>
-            <a:ext cx="7848600" cy="2362200"/>
-          </a:xfrm>
-          <a:solidFill>
-            <a:srgbClr val="000000">
-              <a:alpha val="69804"/>
-            </a:srgbClr>
-          </a:solidFill>
-          <a:effectLst>
-            <a:softEdge rad="63500"/>
-          </a:effectLst>
-        </p:spPr>
-        <p:style>
-          <a:lnRef idx="1">
-            <a:schemeClr val="accent1"/>
-          </a:lnRef>
-          <a:fillRef idx="2">
-            <a:schemeClr val="accent1"/>
-          </a:fillRef>
-          <a:effectRef idx="1">
-            <a:schemeClr val="accent1"/>
-          </a:effectRef>
-          <a:fontRef idx="minor">
-            <a:schemeClr val="dk1"/>
-          </a:fontRef>
-        </p:style>
-        <p:txBody>
-          <a:bodyPr anchor="ctr">
-            <a:normAutofit fontScale="90000"/>
-          </a:bodyPr>
-          <a:lstStyle/>
-          <a:p>
-            <a:pPr algn="ctr"/>
-            <a:r>
-              <a:rPr lang="en-US" cap="small" dirty="0" err="1">
-                <a:solidFill>
-                  <a:schemeClr val="tx1"/>
-                </a:solidFill>
-              </a:rPr>
-              <a:t>.Net</a:t>
-            </a:r>
-            <a:r>
-              <a:rPr lang="en-US" cap="small" dirty="0">
-                <a:solidFill>
-                  <a:schemeClr val="tx1"/>
-                </a:solidFill>
-              </a:rPr>
-              <a:t> Compiler Platform</a:t>
-            </a:r>
-            <a:br>
-              <a:rPr lang="en-US" cap="small" dirty="0">
-                <a:solidFill>
-                  <a:schemeClr val="tx1"/>
-                </a:solidFill>
-              </a:rPr>
-            </a:br>
-            <a:r>
-              <a:rPr lang="en-US" cap="small" dirty="0">
-                <a:solidFill>
-                  <a:schemeClr val="tx1"/>
-                </a:solidFill>
-              </a:rPr>
-              <a:t>(Roslyn)</a:t>
-            </a:r>
-            <a:br>
-              <a:rPr lang="en-US" cap="small" dirty="0">
-                <a:solidFill>
-                  <a:schemeClr val="tx1"/>
-                </a:solidFill>
-              </a:rPr>
-            </a:br>
-            <a:r>
-              <a:rPr lang="en-US" cap="small" dirty="0">
-                <a:solidFill>
-                  <a:schemeClr val="tx1"/>
-                </a:solidFill>
-              </a:rPr>
-              <a:t>And You</a:t>
-            </a:r>
-            <a:br>
-              <a:rPr lang="en-US" cap="small" dirty="0">
-                <a:solidFill>
-                  <a:schemeClr val="tx1"/>
-                </a:solidFill>
-              </a:rPr>
-            </a:br>
-            <a:r>
-              <a:rPr lang="en-US" sz="2200" dirty="0">
-                <a:solidFill>
-                  <a:schemeClr val="tx1"/>
-                </a:solidFill>
-                <a:latin typeface="Segoe UI" panose="020B0502040204020203" pitchFamily="34" charset="0"/>
-                <a:hlinkClick r:id="rId6"/>
-              </a:rPr>
-              <a:t>https://github.com/jwooley/RoslynAndYou</a:t>
-            </a:r>
-            <a:br>
-              <a:rPr lang="en-US" sz="2200" dirty="0">
-                <a:solidFill>
-                  <a:schemeClr val="tx1"/>
-                </a:solidFill>
-                <a:latin typeface="Segoe UI" panose="020B0502040204020203" pitchFamily="34" charset="0"/>
-              </a:rPr>
-            </a:br>
-            <a:r>
-              <a:rPr lang="en-US" sz="2400" dirty="0">
-                <a:solidFill>
-                  <a:schemeClr val="tx1"/>
-                </a:solidFill>
-                <a:hlinkClick r:id="rId7"/>
-              </a:rPr>
-              <a:t>https://jwooley.github.io</a:t>
-            </a:r>
-            <a:r>
-              <a:rPr lang="en-US" sz="2400" cap="small" dirty="0">
-                <a:solidFill>
-                  <a:schemeClr val="tx1"/>
-                </a:solidFill>
-                <a:hlinkClick r:id="rId7"/>
-              </a:rPr>
-              <a:t>/</a:t>
-            </a:r>
-            <a:endParaRPr lang="en-US" sz="2200" cap="small" dirty="0">
-              <a:solidFill>
-                <a:schemeClr val="tx1"/>
-              </a:solidFill>
-            </a:endParaRPr>
-          </a:p>
-        </p:txBody>
-      </p:sp>
-    </p:spTree>
-    <p:extLst>
-      <p:ext uri="{BB962C8B-B14F-4D97-AF65-F5344CB8AC3E}">
-        <p14:creationId xmlns:p14="http://schemas.microsoft.com/office/powerpoint/2010/main" val="2613547704"/>
       </p:ext>
     </p:extLst>
   </p:cSld>

</xml_diff>